<commit_message>
Corrected grammar and spelling mistakes
</commit_message>
<xml_diff>
--- a/Patagonia app.pptx
+++ b/Patagonia app.pptx
@@ -108,6 +108,11 @@
       </a:defRPr>
     </a:lvl9pPr>
   </p:defaultTextStyle>
+  <p:extLst>
+    <p:ext uri="{EFAFB233-063F-42B5-8137-9DF3F51BA10A}">
+      <p15:sldGuideLst xmlns:p15="http://schemas.microsoft.com/office/powerpoint/2012/main"/>
+    </p:ext>
+  </p:extLst>
 </p:presentation>
 </file>
 
@@ -302,7 +307,7 @@
           <a:p>
             <a:fld id="{6D22F896-40B5-4ADD-8801-0D06FADFA095}" type="slidenum">
               <a:rPr lang="en-US" dirty="0"/>
-              <a:t>‹#›</a:t>
+              <a:t>‹Nº›</a:t>
             </a:fld>
             <a:endParaRPr lang="en-US" dirty="0"/>
           </a:p>
@@ -498,7 +503,7 @@
           <a:p>
             <a:fld id="{6D22F896-40B5-4ADD-8801-0D06FADFA095}" type="slidenum">
               <a:rPr lang="en-US" dirty="0"/>
-              <a:t>‹#›</a:t>
+              <a:t>‹Nº›</a:t>
             </a:fld>
             <a:endParaRPr lang="en-US" dirty="0"/>
           </a:p>
@@ -708,7 +713,7 @@
           <a:p>
             <a:fld id="{6D22F896-40B5-4ADD-8801-0D06FADFA095}" type="slidenum">
               <a:rPr lang="en-US" dirty="0"/>
-              <a:t>‹#›</a:t>
+              <a:t>‹Nº›</a:t>
             </a:fld>
             <a:endParaRPr lang="en-US" dirty="0"/>
           </a:p>
@@ -904,7 +909,7 @@
           <a:p>
             <a:fld id="{6D22F896-40B5-4ADD-8801-0D06FADFA095}" type="slidenum">
               <a:rPr lang="en-US" dirty="0"/>
-              <a:t>‹#›</a:t>
+              <a:t>‹Nº›</a:t>
             </a:fld>
             <a:endParaRPr lang="en-US" dirty="0"/>
           </a:p>
@@ -1178,7 +1183,7 @@
           <a:p>
             <a:fld id="{6D22F896-40B5-4ADD-8801-0D06FADFA095}" type="slidenum">
               <a:rPr lang="en-US" dirty="0"/>
-              <a:t>‹#›</a:t>
+              <a:t>‹Nº›</a:t>
             </a:fld>
             <a:endParaRPr lang="en-US" dirty="0"/>
           </a:p>
@@ -1441,7 +1446,7 @@
           <a:p>
             <a:fld id="{6D22F896-40B5-4ADD-8801-0D06FADFA095}" type="slidenum">
               <a:rPr lang="en-US" dirty="0"/>
-              <a:t>‹#›</a:t>
+              <a:t>‹Nº›</a:t>
             </a:fld>
             <a:endParaRPr lang="en-US" dirty="0"/>
           </a:p>
@@ -1852,7 +1857,7 @@
           <a:p>
             <a:fld id="{6D22F896-40B5-4ADD-8801-0D06FADFA095}" type="slidenum">
               <a:rPr lang="en-US" dirty="0"/>
-              <a:t>‹#›</a:t>
+              <a:t>‹Nº›</a:t>
             </a:fld>
             <a:endParaRPr lang="en-US" dirty="0"/>
           </a:p>
@@ -1996,7 +2001,7 @@
           <a:p>
             <a:fld id="{6D22F896-40B5-4ADD-8801-0D06FADFA095}" type="slidenum">
               <a:rPr lang="en-US" dirty="0"/>
-              <a:t>‹#›</a:t>
+              <a:t>‹Nº›</a:t>
             </a:fld>
             <a:endParaRPr lang="en-US" dirty="0"/>
           </a:p>
@@ -2117,7 +2122,7 @@
           <a:p>
             <a:fld id="{6D22F896-40B5-4ADD-8801-0D06FADFA095}" type="slidenum">
               <a:rPr lang="en-US" dirty="0"/>
-              <a:t>‹#›</a:t>
+              <a:t>‹Nº›</a:t>
             </a:fld>
             <a:endParaRPr lang="en-US" dirty="0"/>
           </a:p>
@@ -2363,7 +2368,7 @@
           <a:p>
             <a:fld id="{6D22F896-40B5-4ADD-8801-0D06FADFA095}" type="slidenum">
               <a:rPr lang="en-US" dirty="0"/>
-              <a:t>‹#›</a:t>
+              <a:t>‹Nº›</a:t>
             </a:fld>
             <a:endParaRPr lang="en-US" dirty="0"/>
           </a:p>
@@ -2809,7 +2814,7 @@
           <a:p>
             <a:fld id="{6D22F896-40B5-4ADD-8801-0D06FADFA095}" type="slidenum">
               <a:rPr lang="en-US" dirty="0"/>
-              <a:t>‹#›</a:t>
+              <a:t>‹Nº›</a:t>
             </a:fld>
             <a:endParaRPr lang="en-US" dirty="0"/>
           </a:p>
@@ -3161,7 +3166,7 @@
             <a:fld id="{6D22F896-40B5-4ADD-8801-0D06FADFA095}" type="slidenum">
               <a:rPr lang="en-US" dirty="0"/>
               <a:pPr/>
-              <a:t>‹#›</a:t>
+              <a:t>‹Nº›</a:t>
             </a:fld>
             <a:endParaRPr lang="en-US" dirty="0"/>
           </a:p>
@@ -3610,7 +3615,7 @@
             </a:r>
             <a:r>
               <a:rPr lang="es-AR" dirty="0"/>
-              <a:t>engadgement</a:t>
+              <a:t>engagement</a:t>
             </a:r>
           </a:p>
         </p:txBody>
@@ -3713,7 +3718,7 @@
               <a:t> la </a:t>
             </a:r>
             <a:r>
-              <a:rPr lang="en-US" dirty="0" err="1"/>
+              <a:rPr lang="es-AR" dirty="0"/>
               <a:t>experiencia</a:t>
             </a:r>
             <a:r>
@@ -3721,106 +3726,20 @@
               <a:t> del </a:t>
             </a:r>
             <a:r>
-              <a:rPr lang="en-US" dirty="0" err="1"/>
+              <a:rPr lang="es-AR" dirty="0"/>
               <a:t>usuario</a:t>
             </a:r>
-            <a:endParaRPr lang="en-US" dirty="0"/>
-          </a:p>
-          <a:p>
-            <a:r>
-              <a:rPr lang="en-US" dirty="0" err="1"/>
-              <a:t>Recopilar</a:t>
-            </a:r>
-            <a:r>
-              <a:rPr lang="en-US" dirty="0"/>
-              <a:t> </a:t>
-            </a:r>
-            <a:r>
-              <a:rPr lang="en-US" dirty="0" err="1"/>
-              <a:t>informacion</a:t>
-            </a:r>
-            <a:r>
-              <a:rPr lang="en-US" dirty="0"/>
-              <a:t> </a:t>
-            </a:r>
-            <a:r>
-              <a:rPr lang="en-US" dirty="0" err="1"/>
-              <a:t>procesada</a:t>
-            </a:r>
-            <a:r>
-              <a:rPr lang="en-US" dirty="0"/>
-              <a:t> de la mayor </a:t>
-            </a:r>
-            <a:r>
-              <a:rPr lang="en-US" dirty="0" err="1"/>
-              <a:t>cantidad</a:t>
-            </a:r>
-            <a:r>
-              <a:rPr lang="en-US" dirty="0"/>
-              <a:t> de </a:t>
-            </a:r>
-            <a:r>
-              <a:rPr lang="en-US" dirty="0" err="1"/>
-              <a:t>clientes</a:t>
-            </a:r>
-            <a:r>
-              <a:rPr lang="en-US" dirty="0"/>
-              <a:t> </a:t>
-            </a:r>
-            <a:r>
-              <a:rPr lang="en-US" dirty="0" err="1"/>
-              <a:t>posibles</a:t>
-            </a:r>
-            <a:endParaRPr lang="en-US" dirty="0"/>
-          </a:p>
-          <a:p>
-            <a:r>
-              <a:rPr lang="en-US" dirty="0" err="1"/>
-              <a:t>Potenciar</a:t>
-            </a:r>
-            <a:r>
-              <a:rPr lang="en-US" dirty="0"/>
-              <a:t> las </a:t>
-            </a:r>
-            <a:r>
-              <a:rPr lang="en-US" dirty="0" err="1"/>
-              <a:t>ventas</a:t>
-            </a:r>
-            <a:r>
-              <a:rPr lang="en-US" dirty="0"/>
-              <a:t> </a:t>
-            </a:r>
-            <a:r>
-              <a:rPr lang="en-US" dirty="0" err="1"/>
-              <a:t>en</a:t>
-            </a:r>
-            <a:r>
-              <a:rPr lang="en-US" dirty="0"/>
-              <a:t> </a:t>
-            </a:r>
-            <a:r>
-              <a:rPr lang="en-US" dirty="0" err="1"/>
-              <a:t>los</a:t>
-            </a:r>
-            <a:r>
-              <a:rPr lang="en-US" dirty="0"/>
-              <a:t> </a:t>
-            </a:r>
-            <a:r>
-              <a:rPr lang="en-US" dirty="0" err="1"/>
-              <a:t>distintos</a:t>
-            </a:r>
-            <a:r>
-              <a:rPr lang="en-US" dirty="0"/>
-              <a:t> </a:t>
-            </a:r>
-            <a:r>
-              <a:rPr lang="en-US" dirty="0" err="1"/>
-              <a:t>tipos</a:t>
-            </a:r>
-            <a:r>
-              <a:rPr lang="en-US" dirty="0"/>
-              <a:t> de bares Patagonia</a:t>
+          </a:p>
+          <a:p>
+            <a:r>
+              <a:rPr lang="es-AR" dirty="0"/>
+              <a:t>Recopilar información procesada de la mayor cantidad de clientes posibles</a:t>
+            </a:r>
+          </a:p>
+          <a:p>
+            <a:r>
+              <a:rPr lang="es-AR" dirty="0"/>
+              <a:t>Potenciar las ventas en los distintos tipos de bares Patagonia</a:t>
             </a:r>
           </a:p>
           <a:p>
@@ -3921,10 +3840,9 @@
           <a:lstStyle/>
           <a:p>
             <a:r>
-              <a:rPr lang="en-US" dirty="0" err="1"/>
-              <a:t>Solucion</a:t>
-            </a:r>
-            <a:endParaRPr lang="es-AR" dirty="0"/>
+              <a:rPr lang="es-AR" dirty="0"/>
+              <a:t>Solución</a:t>
+            </a:r>
           </a:p>
         </p:txBody>
       </p:sp>
@@ -3946,264 +3864,78 @@
           <a:lstStyle/>
           <a:p>
             <a:r>
-              <a:rPr lang="en-US" dirty="0" err="1"/>
-              <a:t>Aplicacion</a:t>
-            </a:r>
-            <a:r>
-              <a:rPr lang="en-US" dirty="0"/>
-              <a:t> </a:t>
-            </a:r>
-            <a:r>
-              <a:rPr lang="en-US" dirty="0" err="1"/>
-              <a:t>nativa</a:t>
-            </a:r>
-            <a:r>
-              <a:rPr lang="en-US" dirty="0"/>
-              <a:t> para </a:t>
-            </a:r>
-            <a:r>
-              <a:rPr lang="en-US" dirty="0" err="1"/>
-              <a:t>dispositivos</a:t>
-            </a:r>
-            <a:r>
-              <a:rPr lang="en-US" dirty="0"/>
-              <a:t> </a:t>
-            </a:r>
-            <a:r>
-              <a:rPr lang="en-US" dirty="0" err="1"/>
-              <a:t>moviles</a:t>
-            </a:r>
-            <a:endParaRPr lang="en-US" dirty="0"/>
+              <a:rPr lang="es-AR" dirty="0"/>
+              <a:t>Aplicación nativa para dispositivos móviles</a:t>
+            </a:r>
           </a:p>
           <a:p>
             <a:pPr lvl="1"/>
             <a:r>
-              <a:rPr lang="en-US" dirty="0" err="1"/>
-              <a:t>Mapa</a:t>
-            </a:r>
-            <a:r>
-              <a:rPr lang="en-US" dirty="0"/>
-              <a:t> de bares </a:t>
-            </a:r>
-            <a:r>
-              <a:rPr lang="en-US" dirty="0" err="1"/>
-              <a:t>en</a:t>
-            </a:r>
-            <a:r>
-              <a:rPr lang="en-US" dirty="0"/>
-              <a:t> </a:t>
-            </a:r>
-            <a:r>
-              <a:rPr lang="en-US" dirty="0" err="1"/>
-              <a:t>detalle</a:t>
-            </a:r>
-            <a:endParaRPr lang="en-US" dirty="0"/>
+              <a:rPr lang="es-AR" dirty="0"/>
+              <a:t>Mapa de bares en detalle</a:t>
+            </a:r>
           </a:p>
           <a:p>
             <a:pPr lvl="1"/>
             <a:r>
-              <a:rPr lang="en-US" dirty="0" err="1"/>
-              <a:t>Logueo</a:t>
-            </a:r>
-            <a:r>
-              <a:rPr lang="en-US" dirty="0"/>
-              <a:t> con Google/Facebook</a:t>
+              <a:rPr lang="es-AR" dirty="0"/>
+              <a:t>Logueo con Google/Facebook</a:t>
             </a:r>
           </a:p>
           <a:p>
             <a:pPr lvl="1"/>
             <a:r>
-              <a:rPr lang="en-US" dirty="0" err="1"/>
-              <a:t>Perfil</a:t>
-            </a:r>
-            <a:r>
-              <a:rPr lang="en-US" dirty="0"/>
-              <a:t> de </a:t>
-            </a:r>
-            <a:r>
-              <a:rPr lang="en-US" dirty="0" err="1"/>
-              <a:t>consumidor</a:t>
-            </a:r>
-            <a:endParaRPr lang="en-US" dirty="0"/>
+              <a:rPr lang="es-AR" dirty="0"/>
+              <a:t>Perfil de consumidor</a:t>
+            </a:r>
           </a:p>
           <a:p>
             <a:pPr lvl="1"/>
             <a:r>
-              <a:rPr lang="en-US" dirty="0" err="1"/>
-              <a:t>Grupos</a:t>
-            </a:r>
-            <a:r>
-              <a:rPr lang="en-US" dirty="0"/>
-              <a:t> de amigos</a:t>
+              <a:rPr lang="es-AR" dirty="0"/>
+              <a:t>Grupos de amigos</a:t>
             </a:r>
           </a:p>
           <a:p>
             <a:pPr lvl="1"/>
             <a:r>
-              <a:rPr lang="en-US" dirty="0" err="1"/>
-              <a:t>Pedidos</a:t>
-            </a:r>
-            <a:r>
-              <a:rPr lang="en-US" dirty="0"/>
-              <a:t> online</a:t>
+              <a:rPr lang="es-AR" dirty="0"/>
+              <a:t>Pedidos online</a:t>
             </a:r>
           </a:p>
           <a:p>
             <a:pPr lvl="1"/>
             <a:r>
-              <a:rPr lang="en-US" dirty="0" err="1"/>
-              <a:t>Historial</a:t>
-            </a:r>
-            <a:r>
-              <a:rPr lang="en-US" dirty="0"/>
-              <a:t> y </a:t>
-            </a:r>
-            <a:r>
-              <a:rPr lang="en-US" dirty="0" err="1"/>
-              <a:t>estadisticas</a:t>
-            </a:r>
-            <a:r>
-              <a:rPr lang="en-US" dirty="0"/>
-              <a:t> </a:t>
-            </a:r>
-            <a:r>
-              <a:rPr lang="en-US" dirty="0" err="1"/>
-              <a:t>personales</a:t>
-            </a:r>
-            <a:endParaRPr lang="en-US" dirty="0"/>
+              <a:rPr lang="es-AR" dirty="0"/>
+              <a:t>Historial y estadísticas personales</a:t>
+            </a:r>
           </a:p>
           <a:p>
             <a:pPr lvl="1"/>
             <a:r>
-              <a:rPr lang="en-US" dirty="0" err="1"/>
-              <a:t>Informacion</a:t>
-            </a:r>
-            <a:r>
-              <a:rPr lang="en-US" dirty="0"/>
-              <a:t> de Patagonia y </a:t>
-            </a:r>
-            <a:r>
-              <a:rPr lang="en-US" dirty="0" err="1"/>
-              <a:t>sus</a:t>
-            </a:r>
-            <a:r>
-              <a:rPr lang="en-US" dirty="0"/>
-              <a:t> </a:t>
-            </a:r>
-            <a:r>
-              <a:rPr lang="en-US" dirty="0" err="1"/>
-              <a:t>productos</a:t>
-            </a:r>
-            <a:endParaRPr lang="en-US" dirty="0"/>
+              <a:rPr lang="es-AR" dirty="0"/>
+              <a:t>Información de Patagonia y sus productos</a:t>
+            </a:r>
           </a:p>
           <a:p>
             <a:pPr lvl="1"/>
             <a:r>
-              <a:rPr lang="en-US" dirty="0" err="1"/>
-              <a:t>Seccion</a:t>
-            </a:r>
-            <a:r>
-              <a:rPr lang="en-US" dirty="0"/>
-              <a:t> de </a:t>
-            </a:r>
-            <a:r>
-              <a:rPr lang="en-US" dirty="0" err="1"/>
-              <a:t>novedades</a:t>
-            </a:r>
-            <a:r>
-              <a:rPr lang="en-US" dirty="0"/>
-              <a:t> </a:t>
-            </a:r>
-            <a:r>
-              <a:rPr lang="en-US" dirty="0" err="1"/>
-              <a:t>personificadas</a:t>
-            </a:r>
-            <a:r>
-              <a:rPr lang="en-US" dirty="0"/>
-              <a:t> para </a:t>
-            </a:r>
-            <a:r>
-              <a:rPr lang="en-US" dirty="0" err="1"/>
-              <a:t>cada</a:t>
-            </a:r>
-            <a:r>
-              <a:rPr lang="en-US" dirty="0"/>
-              <a:t> </a:t>
+              <a:rPr lang="es-AR" dirty="0"/>
+              <a:t>Sección de novedades personalizadas para cada usuario </a:t>
             </a:r>
           </a:p>
           <a:p>
             <a:pPr lvl="1"/>
             <a:r>
-              <a:rPr lang="en-US" dirty="0" err="1"/>
-              <a:t>Descuentos</a:t>
-            </a:r>
-            <a:r>
-              <a:rPr lang="en-US" dirty="0"/>
-              <a:t> </a:t>
-            </a:r>
-            <a:r>
-              <a:rPr lang="en-US" dirty="0" err="1"/>
-              <a:t>regidos</a:t>
-            </a:r>
-            <a:r>
-              <a:rPr lang="en-US" dirty="0"/>
-              <a:t> </a:t>
-            </a:r>
-            <a:r>
-              <a:rPr lang="en-US" dirty="0" err="1"/>
-              <a:t>por</a:t>
-            </a:r>
-            <a:r>
-              <a:rPr lang="en-US" dirty="0"/>
-              <a:t> </a:t>
-            </a:r>
-            <a:r>
-              <a:rPr lang="en-US" dirty="0" err="1"/>
-              <a:t>oferta-demanda</a:t>
-            </a:r>
-            <a:endParaRPr lang="en-US" dirty="0"/>
+              <a:rPr lang="es-AR" dirty="0"/>
+              <a:t>Descuentos regidos por oferta-demanda</a:t>
+            </a:r>
           </a:p>
           <a:p>
             <a:pPr lvl="1"/>
             <a:r>
-              <a:rPr lang="en-US" dirty="0" err="1"/>
-              <a:t>Proyecciones</a:t>
-            </a:r>
-            <a:r>
-              <a:rPr lang="en-US" dirty="0"/>
-              <a:t> </a:t>
-            </a:r>
-            <a:r>
-              <a:rPr lang="en-US" dirty="0" err="1"/>
-              <a:t>semanales</a:t>
-            </a:r>
-            <a:r>
-              <a:rPr lang="en-US" dirty="0"/>
-              <a:t> de </a:t>
-            </a:r>
-            <a:r>
-              <a:rPr lang="en-US" dirty="0" err="1"/>
-              <a:t>disponibilidad</a:t>
-            </a:r>
-            <a:r>
-              <a:rPr lang="en-US" dirty="0"/>
-              <a:t> de mesas </a:t>
-            </a:r>
-            <a:r>
-              <a:rPr lang="en-US" dirty="0" err="1"/>
-              <a:t>en</a:t>
-            </a:r>
-            <a:r>
-              <a:rPr lang="en-US" dirty="0"/>
-              <a:t> </a:t>
-            </a:r>
-            <a:r>
-              <a:rPr lang="en-US" dirty="0" err="1"/>
-              <a:t>los</a:t>
-            </a:r>
-            <a:r>
-              <a:rPr lang="en-US" dirty="0"/>
-              <a:t> bares.</a:t>
+              <a:rPr lang="es-AR" dirty="0"/>
+              <a:t>Proyecciones semanales de disponibilidad de mesas en los bares.</a:t>
             </a:r>
           </a:p>
           <a:p>
@@ -4260,10 +3992,9 @@
           <a:lstStyle/>
           <a:p>
             <a:r>
-              <a:rPr lang="en-US" dirty="0" err="1"/>
-              <a:t>solucion</a:t>
-            </a:r>
-            <a:endParaRPr lang="es-AR" dirty="0"/>
+              <a:rPr lang="es-AR" dirty="0"/>
+              <a:t>solución</a:t>
+            </a:r>
           </a:p>
         </p:txBody>
       </p:sp>
@@ -4381,26 +4112,9 @@
           <a:lstStyle/>
           <a:p>
             <a:r>
-              <a:rPr lang="en-US" dirty="0" err="1"/>
-              <a:t>Posibles</a:t>
-            </a:r>
-            <a:r>
-              <a:rPr lang="en-US" dirty="0"/>
-              <a:t> </a:t>
-            </a:r>
-            <a:r>
-              <a:rPr lang="en-US" dirty="0" err="1"/>
-              <a:t>extensiones</a:t>
-            </a:r>
-            <a:r>
-              <a:rPr lang="en-US" dirty="0"/>
-              <a:t> </a:t>
-            </a:r>
-            <a:r>
-              <a:rPr lang="en-US" dirty="0" err="1"/>
-              <a:t>futuras</a:t>
-            </a:r>
-            <a:endParaRPr lang="es-AR" dirty="0"/>
+              <a:rPr lang="es-AR" dirty="0"/>
+              <a:t>Posibles extensiones futuras</a:t>
+            </a:r>
           </a:p>
         </p:txBody>
       </p:sp>
@@ -4420,161 +4134,27 @@
           <a:lstStyle/>
           <a:p>
             <a:r>
-              <a:rPr lang="en-US" dirty="0"/>
-              <a:t>Inclusion de un </a:t>
-            </a:r>
-            <a:r>
-              <a:rPr lang="en-US" dirty="0" err="1"/>
-              <a:t>subsistema</a:t>
-            </a:r>
-            <a:r>
-              <a:rPr lang="en-US" dirty="0"/>
-              <a:t> </a:t>
-            </a:r>
-            <a:r>
-              <a:rPr lang="en-US" dirty="0" err="1"/>
-              <a:t>fijo</a:t>
-            </a:r>
-            <a:r>
-              <a:rPr lang="en-US" dirty="0"/>
-              <a:t> de tablets </a:t>
-            </a:r>
-            <a:r>
-              <a:rPr lang="en-US" dirty="0" err="1"/>
-              <a:t>en</a:t>
-            </a:r>
-            <a:r>
-              <a:rPr lang="en-US" dirty="0"/>
-              <a:t> bares para </a:t>
-            </a:r>
-            <a:r>
-              <a:rPr lang="en-US" dirty="0" err="1"/>
-              <a:t>incluir</a:t>
-            </a:r>
-            <a:r>
-              <a:rPr lang="en-US" dirty="0"/>
-              <a:t> a mas </a:t>
-            </a:r>
-            <a:r>
-              <a:rPr lang="en-US" dirty="0" err="1"/>
-              <a:t>consumidores</a:t>
-            </a:r>
-            <a:r>
-              <a:rPr lang="en-US" dirty="0"/>
-              <a:t> y </a:t>
-            </a:r>
-            <a:r>
-              <a:rPr lang="en-US" dirty="0" err="1"/>
-              <a:t>agilizar</a:t>
-            </a:r>
-            <a:r>
-              <a:rPr lang="en-US" dirty="0"/>
-              <a:t> el </a:t>
-            </a:r>
-            <a:r>
-              <a:rPr lang="en-US" dirty="0" err="1"/>
-              <a:t>proceso</a:t>
-            </a:r>
-            <a:r>
-              <a:rPr lang="en-US" dirty="0"/>
-              <a:t> de </a:t>
-            </a:r>
-            <a:r>
-              <a:rPr lang="en-US" dirty="0" err="1"/>
-              <a:t>compra</a:t>
-            </a:r>
-            <a:r>
-              <a:rPr lang="en-US" dirty="0"/>
-              <a:t> in situ.</a:t>
-            </a:r>
-          </a:p>
-          <a:p>
-            <a:r>
-              <a:rPr lang="en-US" dirty="0" err="1"/>
-              <a:t>Codigos</a:t>
-            </a:r>
-            <a:r>
-              <a:rPr lang="en-US" dirty="0"/>
-              <a:t> QR </a:t>
-            </a:r>
-            <a:r>
-              <a:rPr lang="en-US" dirty="0" err="1"/>
-              <a:t>por</a:t>
-            </a:r>
-            <a:r>
-              <a:rPr lang="en-US" dirty="0"/>
-              <a:t> mesa/bar</a:t>
-            </a:r>
-          </a:p>
-          <a:p>
-            <a:r>
-              <a:rPr lang="en-US" dirty="0"/>
-              <a:t>Sistema de </a:t>
-            </a:r>
-            <a:r>
-              <a:rPr lang="en-US" dirty="0" err="1"/>
-              <a:t>puntos</a:t>
-            </a:r>
-            <a:r>
-              <a:rPr lang="en-US" dirty="0"/>
-              <a:t> para </a:t>
-            </a:r>
-            <a:r>
-              <a:rPr lang="en-US" dirty="0" err="1"/>
-              <a:t>obtener</a:t>
-            </a:r>
-            <a:r>
-              <a:rPr lang="en-US" dirty="0"/>
-              <a:t> </a:t>
-            </a:r>
-            <a:r>
-              <a:rPr lang="en-US" dirty="0" err="1"/>
-              <a:t>nuevos</a:t>
-            </a:r>
-            <a:r>
-              <a:rPr lang="en-US" dirty="0"/>
-              <a:t> </a:t>
-            </a:r>
-            <a:r>
-              <a:rPr lang="en-US" dirty="0" err="1"/>
-              <a:t>descuentos</a:t>
-            </a:r>
-            <a:endParaRPr lang="en-US" dirty="0"/>
-          </a:p>
-          <a:p>
-            <a:r>
-              <a:rPr lang="en-US" dirty="0" err="1"/>
-              <a:t>Susbsistema</a:t>
-            </a:r>
-            <a:r>
-              <a:rPr lang="en-US" dirty="0"/>
-              <a:t> de control de </a:t>
-            </a:r>
-            <a:r>
-              <a:rPr lang="en-US" dirty="0" err="1"/>
-              <a:t>datos</a:t>
-            </a:r>
-            <a:r>
-              <a:rPr lang="en-US" dirty="0"/>
-              <a:t> </a:t>
-            </a:r>
-            <a:r>
-              <a:rPr lang="en-US" dirty="0" err="1"/>
-              <a:t>basado</a:t>
-            </a:r>
-            <a:r>
-              <a:rPr lang="en-US" dirty="0"/>
-              <a:t> </a:t>
-            </a:r>
-            <a:r>
-              <a:rPr lang="en-US" dirty="0" err="1"/>
-              <a:t>en</a:t>
-            </a:r>
-            <a:r>
-              <a:rPr lang="en-US" dirty="0"/>
-              <a:t> Big Data</a:t>
-            </a:r>
-            <a:endParaRPr lang="es-AR" dirty="0"/>
+              <a:rPr lang="es-AR" dirty="0"/>
+              <a:t>Inclusión de un subsistema fijo de tablets en bares para incluir a mas consumidores y agilizar el proceso de compra in situ.</a:t>
+            </a:r>
+          </a:p>
+          <a:p>
+            <a:r>
+              <a:rPr lang="es-AR" dirty="0"/>
+              <a:t>Códigos QR por mesa/bar</a:t>
+            </a:r>
+          </a:p>
+          <a:p>
+            <a:r>
+              <a:rPr lang="es-AR" dirty="0"/>
+              <a:t>Sistema de puntos para obtener nuevos descuentos</a:t>
+            </a:r>
+          </a:p>
+          <a:p>
+            <a:r>
+              <a:rPr lang="es-AR" dirty="0"/>
+              <a:t>Subsistema de control de datos basado en Big Data</a:t>
+            </a:r>
           </a:p>
         </p:txBody>
       </p:sp>

</xml_diff>